<commit_message>
minor rewording on one PowerPoint slide
</commit_message>
<xml_diff>
--- a/PowerPoints/11 - Code Generation.pptx
+++ b/PowerPoints/11 - Code Generation.pptx
@@ -18562,11 +18562,18 @@
               <a:buNone/>
             </a:pPr>
             <a:r>
-              <a:rPr lang="en-US" sz="1800" dirty="0">
-                <a:latin typeface="Consolas" pitchFamily="49" charset="0"/>
-                <a:cs typeface="Consolas" pitchFamily="49" charset="0"/>
-              </a:rPr>
-              <a:t>    ...  //     emit label L2:</a:t>
+              <a:rPr lang="en-US" sz="1800">
+                <a:latin typeface="Consolas" pitchFamily="49" charset="0"/>
+                <a:cs typeface="Consolas" pitchFamily="49" charset="0"/>
+              </a:rPr>
+              <a:t>L2</a:t>
+            </a:r>
+            <a:r>
+              <a:rPr lang="en-US" sz="1800" dirty="0">
+                <a:latin typeface="Consolas" pitchFamily="49" charset="0"/>
+                <a:cs typeface="Consolas" pitchFamily="49" charset="0"/>
+              </a:rPr>
+              <a:t>:</a:t>
             </a:r>
           </a:p>
         </p:txBody>

</xml_diff>

<commit_message>
corrections to two PowerPoint slides
</commit_message>
<xml_diff>
--- a/PowerPoints/11 - Code Generation.pptx
+++ b/PowerPoints/11 - Code Generation.pptx
@@ -7788,7 +7788,7 @@
               <a:rPr lang="en-US" sz="2000" dirty="0">
                 <a:latin typeface="Consolas" panose="020B0609020204030204" pitchFamily="49" charset="0"/>
               </a:rPr>
-              <a:t>  BLE L2</a:t>
+              <a:t>  BG L2</a:t>
             </a:r>
             <a:br>
               <a:rPr lang="en-US" sz="2000" dirty="0">
@@ -7995,16 +7995,10 @@
               </a:rPr>
             </a:br>
             <a:r>
-              <a:rPr lang="en-US" sz="2000" dirty="0">
-                <a:latin typeface="Consolas" panose="020B0609020204030204" pitchFamily="49" charset="0"/>
-              </a:rPr>
-              <a:t>  </a:t>
-            </a:r>
-            <a:r>
               <a:rPr lang="en-US" sz="2000">
                 <a:latin typeface="Consolas" panose="020B0609020204030204" pitchFamily="49" charset="0"/>
               </a:rPr>
-              <a:t>BG L2</a:t>
+              <a:t>  BLE L2</a:t>
             </a:r>
             <a:endParaRPr lang="en-US" sz="2000" dirty="0">
               <a:latin typeface="Consolas" panose="020B0609020204030204" pitchFamily="49" charset="0"/>

</xml_diff>